<commit_message>
New Pubs Edit 10-4-19
</commit_message>
<xml_diff>
--- a/811M-Ch03_Pandas.pptx
+++ b/811M-Ch03_Pandas.pptx
@@ -16330,7 +16330,7 @@
                 <a:latin typeface="Courier New"/>
                 <a:cs typeface="Courier New"/>
               </a:rPr>
-              <a:t>data2 = DataFrame(np.arange(12.0).reshape((4,3)), columns=list('ace'),index=['one','two'</a:t>
+              <a:t>data2 = DataFrame(np.arange(12.0).reshape((4,3)), columns=list('ace’), index=['one','two'</a:t>
             </a:r>
             <a:r>
               <a:rPr lang="mr-IN" sz="1600" b="1" dirty="0">
@@ -19903,7 +19903,27 @@
                 <a:latin typeface="Courier New"/>
                 <a:cs typeface="Courier New"/>
               </a:rPr>
-              <a:t>print (data.sort_values( by=[1], ascending=False))</a:t>
+              <a:t>print (</a:t>
+            </a:r>
+            <a:r>
+              <a:rPr lang="en-US" sz="1600" b="1" dirty="0" err="1">
+                <a:solidFill>
+                  <a:schemeClr val="tx1"/>
+                </a:solidFill>
+                <a:latin typeface="Courier New"/>
+                <a:cs typeface="Courier New"/>
+              </a:rPr>
+              <a:t>data.sort_values</a:t>
+            </a:r>
+            <a:r>
+              <a:rPr lang="en-US" sz="1600" b="1" dirty="0">
+                <a:solidFill>
+                  <a:schemeClr val="tx1"/>
+                </a:solidFill>
+                <a:latin typeface="Courier New"/>
+                <a:cs typeface="Courier New"/>
+              </a:rPr>
+              <a:t>(by=[1], ascending=False))</a:t>
             </a:r>
           </a:p>
         </p:txBody>
@@ -27116,7 +27136,27 @@
                 <a:latin typeface="Courier New"/>
                 <a:cs typeface="Courier New"/>
               </a:rPr>
-              <a:t>olumns=['a','b’])</a:t>
+              <a:t>olumns=['a','b</a:t>
+            </a:r>
+            <a:r>
+              <a:rPr lang="en-US" sz="1600" b="1" dirty="0">
+                <a:solidFill>
+                  <a:schemeClr val="tx1"/>
+                </a:solidFill>
+                <a:latin typeface="Courier New"/>
+                <a:cs typeface="Courier New"/>
+              </a:rPr>
+              <a:t>'</a:t>
+            </a:r>
+            <a:r>
+              <a:rPr lang="mr-IN" sz="1600" b="1" dirty="0">
+                <a:solidFill>
+                  <a:schemeClr val="tx1"/>
+                </a:solidFill>
+                <a:latin typeface="Courier New"/>
+                <a:cs typeface="Courier New"/>
+              </a:rPr>
+              <a:t>])</a:t>
             </a:r>
           </a:p>
           <a:p>
@@ -28882,7 +28922,7 @@
                 <a:latin typeface="Courier New"/>
                 <a:cs typeface="Courier New"/>
               </a:rPr>
-              <a:t>all_data = {ticker: web.get_data_yahoo(ticker) for ticker in ['AAPL', 'IBM', 'MSFT', 'GOOG’]}</a:t>
+              <a:t>all_data = {ticker: web.get_data_yahoo(ticker) for ticker in ['AAPL', 'IBM', 'MSFT', 'GOOG']}</a:t>
             </a:r>
           </a:p>
           <a:p>
@@ -35473,7 +35513,27 @@
                 <a:latin typeface="Courier New"/>
                 <a:cs typeface="Courier New"/>
               </a:rPr>
-              <a:t>index=[['A','A','A','A','B','B','B','B','C','C','C',’C'],</a:t>
+              <a:t>index=[['A','A','A','A','B','B','B','B','C','C','C',</a:t>
+            </a:r>
+            <a:r>
+              <a:rPr lang="en-US" sz="1600" b="1" dirty="0">
+                <a:solidFill>
+                  <a:schemeClr val="tx1"/>
+                </a:solidFill>
+                <a:latin typeface="Courier New"/>
+                <a:cs typeface="Courier New"/>
+              </a:rPr>
+              <a:t>'</a:t>
+            </a:r>
+            <a:r>
+              <a:rPr lang="mr-IN" sz="1600" b="1" dirty="0">
+                <a:solidFill>
+                  <a:schemeClr val="tx1"/>
+                </a:solidFill>
+                <a:latin typeface="Courier New"/>
+                <a:cs typeface="Courier New"/>
+              </a:rPr>
+              <a:t>C'],</a:t>
             </a:r>
             <a:r>
               <a:rPr lang="en-GB" sz="1600" b="1" dirty="0">
@@ -40413,10 +40473,8 @@
                 <a:latin typeface="Courier New"/>
                 <a:cs typeface="Courier New"/>
               </a:rPr>
-              <a:t>data = Series([1,2,3,4], index=['a','b','c','d’])</a:t>
-            </a:r>
-          </a:p>
-          <a:p>
+              <a:t>data = Series([1,2,3,4], index=['a','b','c','d</a:t>
+            </a:r>
             <a:r>
               <a:rPr lang="en-US" sz="1800" b="1" dirty="0">
                 <a:solidFill>
@@ -40425,6 +40483,28 @@
                 <a:latin typeface="Courier New"/>
                 <a:cs typeface="Courier New"/>
               </a:rPr>
+              <a:t>'</a:t>
+            </a:r>
+            <a:r>
+              <a:rPr lang="mr-IN" sz="1800" b="1" dirty="0">
+                <a:solidFill>
+                  <a:schemeClr val="tx1"/>
+                </a:solidFill>
+                <a:latin typeface="Courier New"/>
+                <a:cs typeface="Courier New"/>
+              </a:rPr>
+              <a:t>])</a:t>
+            </a:r>
+          </a:p>
+          <a:p>
+            <a:r>
+              <a:rPr lang="en-US" sz="1800" b="1" dirty="0">
+                <a:solidFill>
+                  <a:schemeClr val="tx1"/>
+                </a:solidFill>
+                <a:latin typeface="Courier New"/>
+                <a:cs typeface="Courier New"/>
+              </a:rPr>
               <a:t>print (data.index)</a:t>
             </a:r>
           </a:p>
@@ -40437,7 +40517,27 @@
                 <a:latin typeface="Courier New"/>
                 <a:cs typeface="Courier New"/>
               </a:rPr>
-              <a:t>Index([u'a', u'b', u'c', u'd'], dtype='object’)</a:t>
+              <a:t>Index([u'a', u'b', u'c', u'd'], dtype='object</a:t>
+            </a:r>
+            <a:r>
+              <a:rPr lang="en-US" sz="1800" dirty="0">
+                <a:solidFill>
+                  <a:schemeClr val="tx1"/>
+                </a:solidFill>
+                <a:latin typeface="Courier New"/>
+                <a:cs typeface="Courier New"/>
+              </a:rPr>
+              <a:t>'</a:t>
+            </a:r>
+            <a:r>
+              <a:rPr lang="mr-IN" sz="1800" dirty="0">
+                <a:solidFill>
+                  <a:schemeClr val="tx1"/>
+                </a:solidFill>
+                <a:latin typeface="Courier New"/>
+                <a:cs typeface="Courier New"/>
+              </a:rPr>
+              <a:t>)</a:t>
             </a:r>
           </a:p>
           <a:p>
@@ -42799,20 +42899,6 @@
 </file>
 
 <file path=customXml/item1.xml><?xml version="1.0" encoding="utf-8"?>
-<p:properties xmlns:p="http://schemas.microsoft.com/office/2006/metadata/properties" xmlns:xsi="http://www.w3.org/2001/XMLSchema-instance" xmlns:pc="http://schemas.microsoft.com/office/infopath/2007/PartnerControls">
-  <documentManagement>
-    <_dlc_DocId xmlns="037063e9-a85e-4c78-8627-f1a9315663e5">EVEA5JW6U4JV-6-9958</_dlc_DocId>
-    <_dlc_DocIdUrl xmlns="037063e9-a85e-4c78-8627-f1a9315663e5">
-      <Url>https://portal.roitraining.com/Courses/_layouts/DocIdRedir.aspx?ID=EVEA5JW6U4JV-6-9958</Url>
-      <Description>EVEA5JW6U4JV-6-9958</Description>
-    </_dlc_DocIdUrl>
-    <Date_x0020_last_x0020_used xmlns="027ed24f-5970-4294-be5c-0919c5aaa214" xsi:nil="true"/>
-    <Customization_x0020_Information xmlns="027ed24f-5970-4294-be5c-0919c5aaa214" xsi:nil="true"/>
-  </documentManagement>
-</p:properties>
-</file>
-
-<file path=customXml/item2.xml><?xml version="1.0" encoding="utf-8"?>
 <ct:contentTypeSchema xmlns:ct="http://schemas.microsoft.com/office/2006/metadata/contentType" xmlns:ma="http://schemas.microsoft.com/office/2006/metadata/properties/metaAttributes" ct:_="" ma:_="" ma:contentTypeName="Document" ma:contentTypeID="0x0101006B08A054FD435346B287BB258D6D8C2A" ma:contentTypeVersion="2" ma:contentTypeDescription="Create a new document." ma:contentTypeScope="" ma:versionID="6146b90b4382322d8952632f355192b7">
   <xsd:schema xmlns:xsd="http://www.w3.org/2001/XMLSchema" xmlns:xs="http://www.w3.org/2001/XMLSchema" xmlns:p="http://schemas.microsoft.com/office/2006/metadata/properties" xmlns:ns2="027ed24f-5970-4294-be5c-0919c5aaa214" xmlns:ns3="037063e9-a85e-4c78-8627-f1a9315663e5" targetNamespace="http://schemas.microsoft.com/office/2006/metadata/properties" ma:root="true" ma:fieldsID="b5d91f802dafd2e22aeea528efbe2d3e" ns2:_="" ns3:_="">
     <xsd:import namespace="027ed24f-5970-4294-be5c-0919c5aaa214"/>
@@ -42978,16 +43064,21 @@
 </ct:contentTypeSchema>
 </file>
 
-<file path=customXml/item3.xml><?xml version="1.0" encoding="utf-8"?>
-<?mso-contentType ?>
-<FormTemplates xmlns="http://schemas.microsoft.com/sharepoint/v3/contenttype/forms">
-  <Display>DocumentLibraryForm</Display>
-  <Edit>DocumentLibraryForm</Edit>
-  <New>DocumentLibraryForm</New>
-</FormTemplates>
+<file path=customXml/item2.xml><?xml version="1.0" encoding="utf-8"?>
+<p:properties xmlns:p="http://schemas.microsoft.com/office/2006/metadata/properties" xmlns:xsi="http://www.w3.org/2001/XMLSchema-instance" xmlns:pc="http://schemas.microsoft.com/office/infopath/2007/PartnerControls">
+  <documentManagement>
+    <_dlc_DocId xmlns="037063e9-a85e-4c78-8627-f1a9315663e5">EVEA5JW6U4JV-6-9958</_dlc_DocId>
+    <_dlc_DocIdUrl xmlns="037063e9-a85e-4c78-8627-f1a9315663e5">
+      <Url>https://portal.roitraining.com/Courses/_layouts/DocIdRedir.aspx?ID=EVEA5JW6U4JV-6-9958</Url>
+      <Description>EVEA5JW6U4JV-6-9958</Description>
+    </_dlc_DocIdUrl>
+    <Date_x0020_last_x0020_used xmlns="027ed24f-5970-4294-be5c-0919c5aaa214" xsi:nil="true"/>
+    <Customization_x0020_Information xmlns="027ed24f-5970-4294-be5c-0919c5aaa214" xsi:nil="true"/>
+  </documentManagement>
+</p:properties>
 </file>
 
-<file path=customXml/item4.xml><?xml version="1.0" encoding="utf-8"?>
+<file path=customXml/item3.xml><?xml version="1.0" encoding="utf-8"?>
 <?mso-contentType ?>
 <spe:Receivers xmlns:spe="http://schemas.microsoft.com/sharepoint/events">
   <Receiver>
@@ -43033,24 +43124,16 @@
 </spe:Receivers>
 </file>
 
-<file path=customXml/itemProps1.xml><?xml version="1.0" encoding="utf-8"?>
-<ds:datastoreItem xmlns:ds="http://schemas.openxmlformats.org/officeDocument/2006/customXml" ds:itemID="{F47B9207-CE5C-49AD-B414-15CBFA246D65}">
-  <ds:schemaRefs>
-    <ds:schemaRef ds:uri="037063e9-a85e-4c78-8627-f1a9315663e5"/>
-    <ds:schemaRef ds:uri="http://purl.org/dc/terms/"/>
-    <ds:schemaRef ds:uri="http://schemas.microsoft.com/office/infopath/2007/PartnerControls"/>
-    <ds:schemaRef ds:uri="http://schemas.microsoft.com/office/2006/documentManagement/types"/>
-    <ds:schemaRef ds:uri="http://schemas.microsoft.com/office/2006/metadata/properties"/>
-    <ds:schemaRef ds:uri="http://purl.org/dc/elements/1.1/"/>
-    <ds:schemaRef ds:uri="http://schemas.openxmlformats.org/package/2006/metadata/core-properties"/>
-    <ds:schemaRef ds:uri="027ed24f-5970-4294-be5c-0919c5aaa214"/>
-    <ds:schemaRef ds:uri="http://www.w3.org/XML/1998/namespace"/>
-    <ds:schemaRef ds:uri="http://purl.org/dc/dcmitype/"/>
-  </ds:schemaRefs>
-</ds:datastoreItem>
+<file path=customXml/item4.xml><?xml version="1.0" encoding="utf-8"?>
+<?mso-contentType ?>
+<FormTemplates xmlns="http://schemas.microsoft.com/sharepoint/v3/contenttype/forms">
+  <Display>DocumentLibraryForm</Display>
+  <Edit>DocumentLibraryForm</Edit>
+  <New>DocumentLibraryForm</New>
+</FormTemplates>
 </file>
 
-<file path=customXml/itemProps2.xml><?xml version="1.0" encoding="utf-8"?>
+<file path=customXml/itemProps1.xml><?xml version="1.0" encoding="utf-8"?>
 <ds:datastoreItem xmlns:ds="http://schemas.openxmlformats.org/officeDocument/2006/customXml" ds:itemID="{41A1F8C2-0CB7-4B0D-AA1A-054546402046}">
   <ds:schemaRefs>
     <ds:schemaRef ds:uri="http://schemas.microsoft.com/office/2006/metadata/contentType"/>
@@ -43069,18 +43152,35 @@
 </ds:datastoreItem>
 </file>
 
+<file path=customXml/itemProps2.xml><?xml version="1.0" encoding="utf-8"?>
+<ds:datastoreItem xmlns:ds="http://schemas.openxmlformats.org/officeDocument/2006/customXml" ds:itemID="{F47B9207-CE5C-49AD-B414-15CBFA246D65}">
+  <ds:schemaRefs>
+    <ds:schemaRef ds:uri="037063e9-a85e-4c78-8627-f1a9315663e5"/>
+    <ds:schemaRef ds:uri="http://purl.org/dc/terms/"/>
+    <ds:schemaRef ds:uri="http://schemas.microsoft.com/office/infopath/2007/PartnerControls"/>
+    <ds:schemaRef ds:uri="http://schemas.microsoft.com/office/2006/documentManagement/types"/>
+    <ds:schemaRef ds:uri="http://schemas.microsoft.com/office/2006/metadata/properties"/>
+    <ds:schemaRef ds:uri="http://purl.org/dc/elements/1.1/"/>
+    <ds:schemaRef ds:uri="http://schemas.openxmlformats.org/package/2006/metadata/core-properties"/>
+    <ds:schemaRef ds:uri="027ed24f-5970-4294-be5c-0919c5aaa214"/>
+    <ds:schemaRef ds:uri="http://www.w3.org/XML/1998/namespace"/>
+    <ds:schemaRef ds:uri="http://purl.org/dc/dcmitype/"/>
+  </ds:schemaRefs>
+</ds:datastoreItem>
+</file>
+
 <file path=customXml/itemProps3.xml><?xml version="1.0" encoding="utf-8"?>
+<ds:datastoreItem xmlns:ds="http://schemas.openxmlformats.org/officeDocument/2006/customXml" ds:itemID="{B9043294-8302-4947-B882-02D6486F929C}">
+  <ds:schemaRefs>
+    <ds:schemaRef ds:uri="http://schemas.microsoft.com/sharepoint/events"/>
+  </ds:schemaRefs>
+</ds:datastoreItem>
+</file>
+
+<file path=customXml/itemProps4.xml><?xml version="1.0" encoding="utf-8"?>
 <ds:datastoreItem xmlns:ds="http://schemas.openxmlformats.org/officeDocument/2006/customXml" ds:itemID="{2DA015F3-603C-4688-A5F3-81D587DAB8C9}">
   <ds:schemaRefs>
     <ds:schemaRef ds:uri="http://schemas.microsoft.com/sharepoint/v3/contenttype/forms"/>
   </ds:schemaRefs>
 </ds:datastoreItem>
-</file>
-
-<file path=customXml/itemProps4.xml><?xml version="1.0" encoding="utf-8"?>
-<ds:datastoreItem xmlns:ds="http://schemas.openxmlformats.org/officeDocument/2006/customXml" ds:itemID="{B9043294-8302-4947-B882-02D6486F929C}">
-  <ds:schemaRefs>
-    <ds:schemaRef ds:uri="http://schemas.microsoft.com/sharepoint/events"/>
-  </ds:schemaRefs>
-</ds:datastoreItem>
 </file>
</xml_diff>

<commit_message>
New Pubs Edited 10-11-19
</commit_message>
<xml_diff>
--- a/811M-Ch03_Pandas.pptx
+++ b/811M-Ch03_Pandas.pptx
@@ -24982,7 +24982,7 @@
                 <a:latin typeface="Courier New"/>
                 <a:ea typeface="MS PGothic"/>
               </a:rPr>
-              <a:t>customers = DataFrame(data['customers’])</a:t>
+              <a:t>customers = DataFrame(data['customers'])</a:t>
             </a:r>
             <a:endParaRPr lang="en-US" sz="1600" b="1" strike="noStrike" spc="-1" dirty="0">
               <a:latin typeface="Arial"/>
@@ -42899,6 +42899,20 @@
 </file>
 
 <file path=customXml/item1.xml><?xml version="1.0" encoding="utf-8"?>
+<p:properties xmlns:p="http://schemas.microsoft.com/office/2006/metadata/properties" xmlns:xsi="http://www.w3.org/2001/XMLSchema-instance" xmlns:pc="http://schemas.microsoft.com/office/infopath/2007/PartnerControls">
+  <documentManagement>
+    <_dlc_DocId xmlns="037063e9-a85e-4c78-8627-f1a9315663e5">EVEA5JW6U4JV-6-9958</_dlc_DocId>
+    <_dlc_DocIdUrl xmlns="037063e9-a85e-4c78-8627-f1a9315663e5">
+      <Url>https://portal.roitraining.com/Courses/_layouts/DocIdRedir.aspx?ID=EVEA5JW6U4JV-6-9958</Url>
+      <Description>EVEA5JW6U4JV-6-9958</Description>
+    </_dlc_DocIdUrl>
+    <Date_x0020_last_x0020_used xmlns="027ed24f-5970-4294-be5c-0919c5aaa214" xsi:nil="true"/>
+    <Customization_x0020_Information xmlns="027ed24f-5970-4294-be5c-0919c5aaa214" xsi:nil="true"/>
+  </documentManagement>
+</p:properties>
+</file>
+
+<file path=customXml/item2.xml><?xml version="1.0" encoding="utf-8"?>
 <ct:contentTypeSchema xmlns:ct="http://schemas.microsoft.com/office/2006/metadata/contentType" xmlns:ma="http://schemas.microsoft.com/office/2006/metadata/properties/metaAttributes" ct:_="" ma:_="" ma:contentTypeName="Document" ma:contentTypeID="0x0101006B08A054FD435346B287BB258D6D8C2A" ma:contentTypeVersion="2" ma:contentTypeDescription="Create a new document." ma:contentTypeScope="" ma:versionID="6146b90b4382322d8952632f355192b7">
   <xsd:schema xmlns:xsd="http://www.w3.org/2001/XMLSchema" xmlns:xs="http://www.w3.org/2001/XMLSchema" xmlns:p="http://schemas.microsoft.com/office/2006/metadata/properties" xmlns:ns2="027ed24f-5970-4294-be5c-0919c5aaa214" xmlns:ns3="037063e9-a85e-4c78-8627-f1a9315663e5" targetNamespace="http://schemas.microsoft.com/office/2006/metadata/properties" ma:root="true" ma:fieldsID="b5d91f802dafd2e22aeea528efbe2d3e" ns2:_="" ns3:_="">
     <xsd:import namespace="027ed24f-5970-4294-be5c-0919c5aaa214"/>
@@ -43064,21 +43078,16 @@
 </ct:contentTypeSchema>
 </file>
 
-<file path=customXml/item2.xml><?xml version="1.0" encoding="utf-8"?>
-<p:properties xmlns:p="http://schemas.microsoft.com/office/2006/metadata/properties" xmlns:xsi="http://www.w3.org/2001/XMLSchema-instance" xmlns:pc="http://schemas.microsoft.com/office/infopath/2007/PartnerControls">
-  <documentManagement>
-    <_dlc_DocId xmlns="037063e9-a85e-4c78-8627-f1a9315663e5">EVEA5JW6U4JV-6-9958</_dlc_DocId>
-    <_dlc_DocIdUrl xmlns="037063e9-a85e-4c78-8627-f1a9315663e5">
-      <Url>https://portal.roitraining.com/Courses/_layouts/DocIdRedir.aspx?ID=EVEA5JW6U4JV-6-9958</Url>
-      <Description>EVEA5JW6U4JV-6-9958</Description>
-    </_dlc_DocIdUrl>
-    <Date_x0020_last_x0020_used xmlns="027ed24f-5970-4294-be5c-0919c5aaa214" xsi:nil="true"/>
-    <Customization_x0020_Information xmlns="027ed24f-5970-4294-be5c-0919c5aaa214" xsi:nil="true"/>
-  </documentManagement>
-</p:properties>
+<file path=customXml/item3.xml><?xml version="1.0" encoding="utf-8"?>
+<?mso-contentType ?>
+<FormTemplates xmlns="http://schemas.microsoft.com/sharepoint/v3/contenttype/forms">
+  <Display>DocumentLibraryForm</Display>
+  <Edit>DocumentLibraryForm</Edit>
+  <New>DocumentLibraryForm</New>
+</FormTemplates>
 </file>
 
-<file path=customXml/item3.xml><?xml version="1.0" encoding="utf-8"?>
+<file path=customXml/item4.xml><?xml version="1.0" encoding="utf-8"?>
 <?mso-contentType ?>
 <spe:Receivers xmlns:spe="http://schemas.microsoft.com/sharepoint/events">
   <Receiver>
@@ -43124,16 +43133,24 @@
 </spe:Receivers>
 </file>
 
-<file path=customXml/item4.xml><?xml version="1.0" encoding="utf-8"?>
-<?mso-contentType ?>
-<FormTemplates xmlns="http://schemas.microsoft.com/sharepoint/v3/contenttype/forms">
-  <Display>DocumentLibraryForm</Display>
-  <Edit>DocumentLibraryForm</Edit>
-  <New>DocumentLibraryForm</New>
-</FormTemplates>
+<file path=customXml/itemProps1.xml><?xml version="1.0" encoding="utf-8"?>
+<ds:datastoreItem xmlns:ds="http://schemas.openxmlformats.org/officeDocument/2006/customXml" ds:itemID="{F47B9207-CE5C-49AD-B414-15CBFA246D65}">
+  <ds:schemaRefs>
+    <ds:schemaRef ds:uri="037063e9-a85e-4c78-8627-f1a9315663e5"/>
+    <ds:schemaRef ds:uri="http://purl.org/dc/terms/"/>
+    <ds:schemaRef ds:uri="http://schemas.microsoft.com/office/infopath/2007/PartnerControls"/>
+    <ds:schemaRef ds:uri="http://schemas.microsoft.com/office/2006/documentManagement/types"/>
+    <ds:schemaRef ds:uri="http://schemas.microsoft.com/office/2006/metadata/properties"/>
+    <ds:schemaRef ds:uri="http://purl.org/dc/elements/1.1/"/>
+    <ds:schemaRef ds:uri="http://schemas.openxmlformats.org/package/2006/metadata/core-properties"/>
+    <ds:schemaRef ds:uri="027ed24f-5970-4294-be5c-0919c5aaa214"/>
+    <ds:schemaRef ds:uri="http://www.w3.org/XML/1998/namespace"/>
+    <ds:schemaRef ds:uri="http://purl.org/dc/dcmitype/"/>
+  </ds:schemaRefs>
+</ds:datastoreItem>
 </file>
 
-<file path=customXml/itemProps1.xml><?xml version="1.0" encoding="utf-8"?>
+<file path=customXml/itemProps2.xml><?xml version="1.0" encoding="utf-8"?>
 <ds:datastoreItem xmlns:ds="http://schemas.openxmlformats.org/officeDocument/2006/customXml" ds:itemID="{41A1F8C2-0CB7-4B0D-AA1A-054546402046}">
   <ds:schemaRefs>
     <ds:schemaRef ds:uri="http://schemas.microsoft.com/office/2006/metadata/contentType"/>
@@ -43152,35 +43169,18 @@
 </ds:datastoreItem>
 </file>
 
-<file path=customXml/itemProps2.xml><?xml version="1.0" encoding="utf-8"?>
-<ds:datastoreItem xmlns:ds="http://schemas.openxmlformats.org/officeDocument/2006/customXml" ds:itemID="{F47B9207-CE5C-49AD-B414-15CBFA246D65}">
+<file path=customXml/itemProps3.xml><?xml version="1.0" encoding="utf-8"?>
+<ds:datastoreItem xmlns:ds="http://schemas.openxmlformats.org/officeDocument/2006/customXml" ds:itemID="{2DA015F3-603C-4688-A5F3-81D587DAB8C9}">
   <ds:schemaRefs>
-    <ds:schemaRef ds:uri="037063e9-a85e-4c78-8627-f1a9315663e5"/>
-    <ds:schemaRef ds:uri="http://purl.org/dc/terms/"/>
-    <ds:schemaRef ds:uri="http://schemas.microsoft.com/office/infopath/2007/PartnerControls"/>
-    <ds:schemaRef ds:uri="http://schemas.microsoft.com/office/2006/documentManagement/types"/>
-    <ds:schemaRef ds:uri="http://schemas.microsoft.com/office/2006/metadata/properties"/>
-    <ds:schemaRef ds:uri="http://purl.org/dc/elements/1.1/"/>
-    <ds:schemaRef ds:uri="http://schemas.openxmlformats.org/package/2006/metadata/core-properties"/>
-    <ds:schemaRef ds:uri="027ed24f-5970-4294-be5c-0919c5aaa214"/>
-    <ds:schemaRef ds:uri="http://www.w3.org/XML/1998/namespace"/>
-    <ds:schemaRef ds:uri="http://purl.org/dc/dcmitype/"/>
+    <ds:schemaRef ds:uri="http://schemas.microsoft.com/sharepoint/v3/contenttype/forms"/>
   </ds:schemaRefs>
 </ds:datastoreItem>
 </file>
 
-<file path=customXml/itemProps3.xml><?xml version="1.0" encoding="utf-8"?>
+<file path=customXml/itemProps4.xml><?xml version="1.0" encoding="utf-8"?>
 <ds:datastoreItem xmlns:ds="http://schemas.openxmlformats.org/officeDocument/2006/customXml" ds:itemID="{B9043294-8302-4947-B882-02D6486F929C}">
   <ds:schemaRefs>
     <ds:schemaRef ds:uri="http://schemas.microsoft.com/sharepoint/events"/>
   </ds:schemaRefs>
 </ds:datastoreItem>
-</file>
-
-<file path=customXml/itemProps4.xml><?xml version="1.0" encoding="utf-8"?>
-<ds:datastoreItem xmlns:ds="http://schemas.openxmlformats.org/officeDocument/2006/customXml" ds:itemID="{2DA015F3-603C-4688-A5F3-81D587DAB8C9}">
-  <ds:schemaRefs>
-    <ds:schemaRef ds:uri="http://schemas.microsoft.com/sharepoint/v3/contenttype/forms"/>
-  </ds:schemaRefs>
-</ds:datastoreItem>
 </file>
</xml_diff>